<commit_message>
Move off of overleaf due to too many files. Currently working on results
</commit_message>
<xml_diff>
--- a/Diagrams for Thesis.pptx
+++ b/Diagrams for Thesis.pptx
@@ -8,6 +8,7 @@
     <p:sldId id="256" r:id="rId2"/>
     <p:sldId id="257" r:id="rId3"/>
     <p:sldId id="258" r:id="rId4"/>
+    <p:sldId id="259" r:id="rId5"/>
   </p:sldIdLst>
   <p:sldSz cx="12192000" cy="6858000"/>
   <p:notesSz cx="6858000" cy="9144000"/>
@@ -245,7 +246,7 @@
           <a:p>
             <a:fld id="{A55C94B7-9C71-D14C-8ABA-CF404952973C}" type="datetimeFigureOut">
               <a:rPr lang="en-US" smtClean="0"/>
-              <a:t>10/18/17</a:t>
+              <a:t>10/21/17</a:t>
             </a:fld>
             <a:endParaRPr lang="en-US"/>
           </a:p>
@@ -415,7 +416,7 @@
           <a:p>
             <a:fld id="{A55C94B7-9C71-D14C-8ABA-CF404952973C}" type="datetimeFigureOut">
               <a:rPr lang="en-US" smtClean="0"/>
-              <a:t>10/18/17</a:t>
+              <a:t>10/21/17</a:t>
             </a:fld>
             <a:endParaRPr lang="en-US"/>
           </a:p>
@@ -595,7 +596,7 @@
           <a:p>
             <a:fld id="{A55C94B7-9C71-D14C-8ABA-CF404952973C}" type="datetimeFigureOut">
               <a:rPr lang="en-US" smtClean="0"/>
-              <a:t>10/18/17</a:t>
+              <a:t>10/21/17</a:t>
             </a:fld>
             <a:endParaRPr lang="en-US"/>
           </a:p>
@@ -765,7 +766,7 @@
           <a:p>
             <a:fld id="{A55C94B7-9C71-D14C-8ABA-CF404952973C}" type="datetimeFigureOut">
               <a:rPr lang="en-US" smtClean="0"/>
-              <a:t>10/18/17</a:t>
+              <a:t>10/21/17</a:t>
             </a:fld>
             <a:endParaRPr lang="en-US"/>
           </a:p>
@@ -1011,7 +1012,7 @@
           <a:p>
             <a:fld id="{A55C94B7-9C71-D14C-8ABA-CF404952973C}" type="datetimeFigureOut">
               <a:rPr lang="en-US" smtClean="0"/>
-              <a:t>10/18/17</a:t>
+              <a:t>10/21/17</a:t>
             </a:fld>
             <a:endParaRPr lang="en-US"/>
           </a:p>
@@ -1243,7 +1244,7 @@
           <a:p>
             <a:fld id="{A55C94B7-9C71-D14C-8ABA-CF404952973C}" type="datetimeFigureOut">
               <a:rPr lang="en-US" smtClean="0"/>
-              <a:t>10/18/17</a:t>
+              <a:t>10/21/17</a:t>
             </a:fld>
             <a:endParaRPr lang="en-US"/>
           </a:p>
@@ -1610,7 +1611,7 @@
           <a:p>
             <a:fld id="{A55C94B7-9C71-D14C-8ABA-CF404952973C}" type="datetimeFigureOut">
               <a:rPr lang="en-US" smtClean="0"/>
-              <a:t>10/18/17</a:t>
+              <a:t>10/21/17</a:t>
             </a:fld>
             <a:endParaRPr lang="en-US"/>
           </a:p>
@@ -1728,7 +1729,7 @@
           <a:p>
             <a:fld id="{A55C94B7-9C71-D14C-8ABA-CF404952973C}" type="datetimeFigureOut">
               <a:rPr lang="en-US" smtClean="0"/>
-              <a:t>10/18/17</a:t>
+              <a:t>10/21/17</a:t>
             </a:fld>
             <a:endParaRPr lang="en-US"/>
           </a:p>
@@ -1823,7 +1824,7 @@
           <a:p>
             <a:fld id="{A55C94B7-9C71-D14C-8ABA-CF404952973C}" type="datetimeFigureOut">
               <a:rPr lang="en-US" smtClean="0"/>
-              <a:t>10/18/17</a:t>
+              <a:t>10/21/17</a:t>
             </a:fld>
             <a:endParaRPr lang="en-US"/>
           </a:p>
@@ -2100,7 +2101,7 @@
           <a:p>
             <a:fld id="{A55C94B7-9C71-D14C-8ABA-CF404952973C}" type="datetimeFigureOut">
               <a:rPr lang="en-US" smtClean="0"/>
-              <a:t>10/18/17</a:t>
+              <a:t>10/21/17</a:t>
             </a:fld>
             <a:endParaRPr lang="en-US"/>
           </a:p>
@@ -2353,7 +2354,7 @@
           <a:p>
             <a:fld id="{A55C94B7-9C71-D14C-8ABA-CF404952973C}" type="datetimeFigureOut">
               <a:rPr lang="en-US" smtClean="0"/>
-              <a:t>10/18/17</a:t>
+              <a:t>10/21/17</a:t>
             </a:fld>
             <a:endParaRPr lang="en-US"/>
           </a:p>
@@ -2566,7 +2567,7 @@
           <a:p>
             <a:fld id="{A55C94B7-9C71-D14C-8ABA-CF404952973C}" type="datetimeFigureOut">
               <a:rPr lang="en-US" smtClean="0"/>
-              <a:t>10/18/17</a:t>
+              <a:t>10/21/17</a:t>
             </a:fld>
             <a:endParaRPr lang="en-US"/>
           </a:p>
@@ -3220,15 +3221,7 @@
                       <a:ea typeface="Times New Roman" charset="0"/>
                       <a:cs typeface="Times New Roman" charset="0"/>
                     </a:rPr>
-                    <a:t>− </a:t>
-                  </a:r>
-                  <a:r>
-                    <a:rPr lang="en-US" sz="2000" dirty="0" smtClean="0">
-                      <a:latin typeface="Times New Roman" charset="0"/>
-                      <a:ea typeface="Times New Roman" charset="0"/>
-                      <a:cs typeface="Times New Roman" charset="0"/>
-                    </a:rPr>
-                    <a:t>π</a:t>
+                    <a:t>− π</a:t>
                   </a:r>
                   <a:endParaRPr lang="en-US" sz="2000" dirty="0">
                     <a:latin typeface="Times New Roman" charset="0"/>
@@ -3768,15 +3761,7 @@
                     <a:ea typeface="Times New Roman" charset="0"/>
                     <a:cs typeface="Times New Roman" charset="0"/>
                   </a:rPr>
-                  <a:t>− </a:t>
-                </a:r>
-                <a:r>
-                  <a:rPr lang="en-US" sz="2000" dirty="0" smtClean="0">
-                    <a:latin typeface="Times New Roman" charset="0"/>
-                    <a:ea typeface="Times New Roman" charset="0"/>
-                    <a:cs typeface="Times New Roman" charset="0"/>
-                  </a:rPr>
-                  <a:t>π</a:t>
+                  <a:t>− π</a:t>
                 </a:r>
                 <a:endParaRPr lang="en-US" sz="2000" dirty="0">
                   <a:latin typeface="Times New Roman" charset="0"/>
@@ -4386,15 +4371,7 @@
                     <a:ea typeface="Times New Roman" charset="0"/>
                     <a:cs typeface="Times New Roman" charset="0"/>
                   </a:rPr>
-                  <a:t>− </a:t>
-                </a:r>
-                <a:r>
-                  <a:rPr lang="en-US" sz="2000" dirty="0" smtClean="0">
-                    <a:latin typeface="Times New Roman" charset="0"/>
-                    <a:ea typeface="Times New Roman" charset="0"/>
-                    <a:cs typeface="Times New Roman" charset="0"/>
-                  </a:rPr>
-                  <a:t>π</a:t>
+                  <a:t>− π</a:t>
                 </a:r>
                 <a:endParaRPr lang="en-US" sz="2000" dirty="0">
                   <a:latin typeface="Times New Roman" charset="0"/>
@@ -4481,6 +4458,127 @@
     <p:extLst>
       <p:ext uri="{BB962C8B-B14F-4D97-AF65-F5344CB8AC3E}">
         <p14:creationId xmlns:p14="http://schemas.microsoft.com/office/powerpoint/2010/main" val="279439268"/>
+      </p:ext>
+    </p:extLst>
+  </p:cSld>
+  <p:clrMapOvr>
+    <a:masterClrMapping/>
+  </p:clrMapOvr>
+</p:sld>
+</file>
+
+<file path=ppt/slides/slide4.xml><?xml version="1.0" encoding="utf-8"?>
+<p:sld xmlns:a="http://schemas.openxmlformats.org/drawingml/2006/main" xmlns:r="http://schemas.openxmlformats.org/officeDocument/2006/relationships" xmlns:p="http://schemas.openxmlformats.org/presentationml/2006/main">
+  <p:cSld>
+    <p:spTree>
+      <p:nvGrpSpPr>
+        <p:cNvPr id="1" name=""/>
+        <p:cNvGrpSpPr/>
+        <p:nvPr/>
+      </p:nvGrpSpPr>
+      <p:grpSpPr>
+        <a:xfrm>
+          <a:off x="0" y="0"/>
+          <a:ext cx="0" cy="0"/>
+          <a:chOff x="0" y="0"/>
+          <a:chExt cx="0" cy="0"/>
+        </a:xfrm>
+      </p:grpSpPr>
+      <p:grpSp>
+        <p:nvGrpSpPr>
+          <p:cNvPr id="7" name="Group 6"/>
+          <p:cNvGrpSpPr/>
+          <p:nvPr/>
+        </p:nvGrpSpPr>
+        <p:grpSpPr>
+          <a:xfrm>
+            <a:off x="3543300" y="1249606"/>
+            <a:ext cx="4973320" cy="4462272"/>
+            <a:chOff x="3543300" y="1249606"/>
+            <a:chExt cx="4973320" cy="4462272"/>
+          </a:xfrm>
+        </p:grpSpPr>
+        <p:pic>
+          <p:nvPicPr>
+            <p:cNvPr id="5" name="Picture 4"/>
+            <p:cNvPicPr>
+              <a:picLocks noChangeAspect="1"/>
+            </p:cNvPicPr>
+            <p:nvPr/>
+          </p:nvPicPr>
+          <p:blipFill>
+            <a:blip r:embed="rId2">
+              <a:extLst>
+                <a:ext uri="{28A0092B-C50C-407E-A947-70E740481C1C}">
+                  <a14:useLocalDpi xmlns:a14="http://schemas.microsoft.com/office/drawing/2010/main" val="0"/>
+                </a:ext>
+              </a:extLst>
+            </a:blip>
+            <a:stretch>
+              <a:fillRect/>
+            </a:stretch>
+          </p:blipFill>
+          <p:spPr>
+            <a:xfrm>
+              <a:off x="3670300" y="1249606"/>
+              <a:ext cx="4846320" cy="4462272"/>
+            </a:xfrm>
+            <a:prstGeom prst="rect">
+              <a:avLst/>
+            </a:prstGeom>
+          </p:spPr>
+        </p:pic>
+        <p:sp>
+          <p:nvSpPr>
+            <p:cNvPr id="6" name="Rectangle 5"/>
+            <p:cNvSpPr/>
+            <p:nvPr/>
+          </p:nvSpPr>
+          <p:spPr>
+            <a:xfrm>
+              <a:off x="3543300" y="1249606"/>
+              <a:ext cx="653143" cy="439057"/>
+            </a:xfrm>
+            <a:prstGeom prst="rect">
+              <a:avLst/>
+            </a:prstGeom>
+            <a:solidFill>
+              <a:srgbClr val="FEFFFE"/>
+            </a:solidFill>
+            <a:ln>
+              <a:noFill/>
+            </a:ln>
+          </p:spPr>
+          <p:style>
+            <a:lnRef idx="2">
+              <a:schemeClr val="accent1">
+                <a:shade val="50000"/>
+              </a:schemeClr>
+            </a:lnRef>
+            <a:fillRef idx="1">
+              <a:schemeClr val="accent1"/>
+            </a:fillRef>
+            <a:effectRef idx="0">
+              <a:schemeClr val="accent1"/>
+            </a:effectRef>
+            <a:fontRef idx="minor">
+              <a:schemeClr val="lt1"/>
+            </a:fontRef>
+          </p:style>
+          <p:txBody>
+            <a:bodyPr rtlCol="0" anchor="ctr"/>
+            <a:lstStyle/>
+            <a:p>
+              <a:pPr algn="ctr"/>
+              <a:endParaRPr lang="en-US"/>
+            </a:p>
+          </p:txBody>
+        </p:sp>
+      </p:grpSp>
+    </p:spTree>
+    <p:extLst>
+      <p:ext uri="{BB962C8B-B14F-4D97-AF65-F5344CB8AC3E}">
+        <p14:creationId xmlns:p14="http://schemas.microsoft.com/office/powerpoint/2010/main" val="148663970"/>
       </p:ext>
     </p:extLst>
   </p:cSld>

</xml_diff>

<commit_message>
First draft of data acquisition.
</commit_message>
<xml_diff>
--- a/Diagrams for Thesis.pptx
+++ b/Diagrams for Thesis.pptx
@@ -9,6 +9,7 @@
     <p:sldId id="257" r:id="rId3"/>
     <p:sldId id="258" r:id="rId4"/>
     <p:sldId id="259" r:id="rId5"/>
+    <p:sldId id="260" r:id="rId6"/>
   </p:sldIdLst>
   <p:sldSz cx="12192000" cy="6858000"/>
   <p:notesSz cx="6858000" cy="9144000"/>
@@ -4588,6 +4589,65 @@
 </p:sld>
 </file>
 
+<file path=ppt/slides/slide5.xml><?xml version="1.0" encoding="utf-8"?>
+<p:sld xmlns:a="http://schemas.openxmlformats.org/drawingml/2006/main" xmlns:r="http://schemas.openxmlformats.org/officeDocument/2006/relationships" xmlns:p="http://schemas.openxmlformats.org/presentationml/2006/main">
+  <p:cSld>
+    <p:spTree>
+      <p:nvGrpSpPr>
+        <p:cNvPr id="1" name=""/>
+        <p:cNvGrpSpPr/>
+        <p:nvPr/>
+      </p:nvGrpSpPr>
+      <p:grpSpPr>
+        <a:xfrm>
+          <a:off x="0" y="0"/>
+          <a:ext cx="0" cy="0"/>
+          <a:chOff x="0" y="0"/>
+          <a:chExt cx="0" cy="0"/>
+        </a:xfrm>
+      </p:grpSpPr>
+      <p:pic>
+        <p:nvPicPr>
+          <p:cNvPr id="4" name="Picture 3"/>
+          <p:cNvPicPr>
+            <a:picLocks noChangeAspect="1"/>
+          </p:cNvPicPr>
+          <p:nvPr/>
+        </p:nvPicPr>
+        <p:blipFill rotWithShape="1">
+          <a:blip r:embed="rId2">
+            <a:extLst>
+              <a:ext uri="{28A0092B-C50C-407E-A947-70E740481C1C}">
+                <a14:useLocalDpi xmlns:a14="http://schemas.microsoft.com/office/drawing/2010/main" val="0"/>
+              </a:ext>
+            </a:extLst>
+          </a:blip>
+          <a:srcRect l="9844" t="1369" r="1085" b="15167"/>
+          <a:stretch/>
+        </p:blipFill>
+        <p:spPr>
+          <a:xfrm>
+            <a:off x="2574952" y="636607"/>
+            <a:ext cx="7205655" cy="4812381"/>
+          </a:xfrm>
+          <a:prstGeom prst="rect">
+            <a:avLst/>
+          </a:prstGeom>
+        </p:spPr>
+      </p:pic>
+    </p:spTree>
+    <p:extLst>
+      <p:ext uri="{BB962C8B-B14F-4D97-AF65-F5344CB8AC3E}">
+        <p14:creationId xmlns:p14="http://schemas.microsoft.com/office/powerpoint/2010/main" val="1206053174"/>
+      </p:ext>
+    </p:extLst>
+  </p:cSld>
+  <p:clrMapOvr>
+    <a:masterClrMapping/>
+  </p:clrMapOvr>
+</p:sld>
+</file>
+
 <file path=ppt/theme/theme1.xml><?xml version="1.0" encoding="utf-8"?>
 <a:theme xmlns:a="http://schemas.openxmlformats.org/drawingml/2006/main" name="Office Theme">
   <a:themeElements>

</xml_diff>